<commit_message>
material for 2.11.2022 lecture
</commit_message>
<xml_diff>
--- a/lectures/07_SDE_exam-preview/07_Streaming-Data-Engineering_exam-preview.pptx
+++ b/lectures/07_SDE_exam-preview/07_Streaming-Data-Engineering_exam-preview.pptx
@@ -5,19 +5,18 @@
     <p:sldMasterId id="2147483660" r:id="rId1"/>
   </p:sldMasterIdLst>
   <p:notesMasterIdLst>
-    <p:notesMasterId r:id="rId12"/>
+    <p:notesMasterId r:id="rId11"/>
   </p:notesMasterIdLst>
   <p:sldIdLst>
     <p:sldId id="1140" r:id="rId2"/>
     <p:sldId id="1144" r:id="rId3"/>
     <p:sldId id="1143" r:id="rId4"/>
     <p:sldId id="1145" r:id="rId5"/>
-    <p:sldId id="1148" r:id="rId6"/>
-    <p:sldId id="1150" r:id="rId7"/>
+    <p:sldId id="1154" r:id="rId6"/>
+    <p:sldId id="1148" r:id="rId7"/>
     <p:sldId id="1146" r:id="rId8"/>
     <p:sldId id="1151" r:id="rId9"/>
-    <p:sldId id="1152" r:id="rId10"/>
-    <p:sldId id="1153" r:id="rId11"/>
+    <p:sldId id="1153" r:id="rId10"/>
   </p:sldIdLst>
   <p:sldSz cx="12192000" cy="6858000"/>
   <p:notesSz cx="6858000" cy="9144000"/>
@@ -4977,217 +4976,6 @@
 </p:sld>
 </file>
 
-<file path=ppt/slides/slide10.xml><?xml version="1.0" encoding="utf-8"?>
-<p:sld xmlns:a="http://schemas.openxmlformats.org/drawingml/2006/main" xmlns:r="http://schemas.openxmlformats.org/officeDocument/2006/relationships" xmlns:p="http://schemas.openxmlformats.org/presentationml/2006/main">
-  <p:cSld>
-    <p:spTree>
-      <p:nvGrpSpPr>
-        <p:cNvPr id="1" name=""/>
-        <p:cNvGrpSpPr/>
-        <p:nvPr/>
-      </p:nvGrpSpPr>
-      <p:grpSpPr>
-        <a:xfrm>
-          <a:off x="0" y="0"/>
-          <a:ext cx="0" cy="0"/>
-          <a:chOff x="0" y="0"/>
-          <a:chExt cx="0" cy="0"/>
-        </a:xfrm>
-      </p:grpSpPr>
-      <p:sp>
-        <p:nvSpPr>
-          <p:cNvPr id="2" name="Subtitle 1">
-            <a:extLst>
-              <a:ext uri="{FF2B5EF4-FFF2-40B4-BE49-F238E27FC236}">
-                <a16:creationId xmlns:a16="http://schemas.microsoft.com/office/drawing/2014/main" id="{5844CE45-509E-F649-90A4-98FCBA6E2423}"/>
-              </a:ext>
-            </a:extLst>
-          </p:cNvPr>
-          <p:cNvSpPr>
-            <a:spLocks noGrp="1"/>
-          </p:cNvSpPr>
-          <p:nvPr>
-            <p:ph type="subTitle" idx="1"/>
-          </p:nvPr>
-        </p:nvSpPr>
-        <p:spPr/>
-        <p:txBody>
-          <a:bodyPr/>
-          <a:lstStyle/>
-          <a:p>
-            <a:pPr marL="177796" indent="-177796">
-              <a:spcBef>
-                <a:spcPts val="0"/>
-              </a:spcBef>
-              <a:buClr>
-                <a:schemeClr val="lt1"/>
-              </a:buClr>
-              <a:buSzPts val="1800"/>
-            </a:pPr>
-            <a:r>
-              <a:rPr lang="en" b="1" dirty="0">
-                <a:solidFill>
-                  <a:schemeClr val="tx1"/>
-                </a:solidFill>
-                <a:latin typeface="Helvetica Neue Light"/>
-                <a:ea typeface="Helvetica Neue Light"/>
-                <a:cs typeface="Helvetica Neue Light"/>
-                <a:sym typeface="Helvetica Neue Light"/>
-              </a:rPr>
-              <a:t>Emanuele Della Valle</a:t>
-            </a:r>
-          </a:p>
-          <a:p>
-            <a:pPr marL="177796" indent="-177796">
-              <a:spcBef>
-                <a:spcPts val="0"/>
-              </a:spcBef>
-              <a:buClr>
-                <a:schemeClr val="lt1"/>
-              </a:buClr>
-              <a:buSzPts val="1800"/>
-            </a:pPr>
-            <a:r>
-              <a:rPr lang="en" sz="1800" dirty="0" err="1">
-                <a:solidFill>
-                  <a:schemeClr val="tx1"/>
-                </a:solidFill>
-                <a:latin typeface="Helvetica Neue Light"/>
-                <a:ea typeface="Helvetica Neue Light"/>
-                <a:cs typeface="Helvetica Neue Light"/>
-                <a:sym typeface="Helvetica Neue Light"/>
-              </a:rPr>
-              <a:t>Politecnico</a:t>
-            </a:r>
-            <a:r>
-              <a:rPr lang="en" sz="1800" dirty="0">
-                <a:solidFill>
-                  <a:schemeClr val="tx1"/>
-                </a:solidFill>
-                <a:latin typeface="Helvetica Neue Light"/>
-                <a:ea typeface="Helvetica Neue Light"/>
-                <a:cs typeface="Helvetica Neue Light"/>
-                <a:sym typeface="Helvetica Neue Light"/>
-              </a:rPr>
-              <a:t> di Milano </a:t>
-            </a:r>
-          </a:p>
-        </p:txBody>
-      </p:sp>
-      <p:sp>
-        <p:nvSpPr>
-          <p:cNvPr id="3" name="Title 2">
-            <a:extLst>
-              <a:ext uri="{FF2B5EF4-FFF2-40B4-BE49-F238E27FC236}">
-                <a16:creationId xmlns:a16="http://schemas.microsoft.com/office/drawing/2014/main" id="{05E3092D-C75E-7446-AFAD-75E4D4F36537}"/>
-              </a:ext>
-            </a:extLst>
-          </p:cNvPr>
-          <p:cNvSpPr>
-            <a:spLocks noGrp="1"/>
-          </p:cNvSpPr>
-          <p:nvPr>
-            <p:ph type="title"/>
-          </p:nvPr>
-        </p:nvSpPr>
-        <p:spPr>
-          <a:xfrm>
-            <a:off x="960228" y="2531006"/>
-            <a:ext cx="6777003" cy="1795989"/>
-          </a:xfrm>
-        </p:spPr>
-        <p:txBody>
-          <a:bodyPr/>
-          <a:lstStyle/>
-          <a:p>
-            <a:r>
-              <a:rPr lang="en" sz="3200" b="1" dirty="0">
-                <a:solidFill>
-                  <a:schemeClr val="tx1"/>
-                </a:solidFill>
-              </a:rPr>
-              <a:t>Streaming Data Analytics </a:t>
-            </a:r>
-            <a:br>
-              <a:rPr lang="en" sz="4267" b="1" dirty="0">
-                <a:solidFill>
-                  <a:schemeClr val="tx1"/>
-                </a:solidFill>
-              </a:rPr>
-            </a:br>
-            <a:r>
-              <a:rPr lang="en" sz="4267" b="1" dirty="0">
-                <a:solidFill>
-                  <a:schemeClr val="tx1"/>
-                </a:solidFill>
-              </a:rPr>
-              <a:t>Exam Options</a:t>
-            </a:r>
-            <a:endParaRPr lang="en-US" sz="4267" b="1" dirty="0">
-              <a:solidFill>
-                <a:schemeClr val="tx1"/>
-              </a:solidFill>
-            </a:endParaRPr>
-          </a:p>
-        </p:txBody>
-      </p:sp>
-      <p:sp>
-        <p:nvSpPr>
-          <p:cNvPr id="4" name="TextBox 3">
-            <a:extLst>
-              <a:ext uri="{FF2B5EF4-FFF2-40B4-BE49-F238E27FC236}">
-                <a16:creationId xmlns:a16="http://schemas.microsoft.com/office/drawing/2014/main" id="{8B388D4E-0571-CE4D-A7E6-D64A0DA6C4F5}"/>
-              </a:ext>
-            </a:extLst>
-          </p:cNvPr>
-          <p:cNvSpPr txBox="1"/>
-          <p:nvPr/>
-        </p:nvSpPr>
-        <p:spPr>
-          <a:xfrm>
-            <a:off x="3087445" y="4098664"/>
-            <a:ext cx="184731" cy="369332"/>
-          </a:xfrm>
-          <a:prstGeom prst="rect">
-            <a:avLst/>
-          </a:prstGeom>
-          <a:noFill/>
-        </p:spPr>
-        <p:txBody>
-          <a:bodyPr wrap="none" rtlCol="0">
-            <a:spAutoFit/>
-          </a:bodyPr>
-          <a:lstStyle/>
-          <a:p>
-            <a:endParaRPr lang="it-IT" dirty="0"/>
-          </a:p>
-        </p:txBody>
-      </p:sp>
-    </p:spTree>
-    <p:extLst>
-      <p:ext uri="{BB962C8B-B14F-4D97-AF65-F5344CB8AC3E}">
-        <p14:creationId xmlns:p14="http://schemas.microsoft.com/office/powerpoint/2010/main" val="1485291633"/>
-      </p:ext>
-    </p:extLst>
-  </p:cSld>
-  <p:clrMapOvr>
-    <a:masterClrMapping/>
-  </p:clrMapOvr>
-  <mc:AlternateContent xmlns:mc="http://schemas.openxmlformats.org/markup-compatibility/2006" xmlns:p14="http://schemas.microsoft.com/office/powerpoint/2010/main">
-    <mc:Choice Requires="p14">
-      <p:transition spd="med" p14:dur="700">
-        <p:fade/>
-      </p:transition>
-    </mc:Choice>
-    <mc:Fallback xmlns="">
-      <p:transition spd="med">
-        <p:fade/>
-      </p:transition>
-    </mc:Fallback>
-  </mc:AlternateContent>
-</p:sld>
-</file>
-
 <file path=ppt/slides/slide2.xml><?xml version="1.0" encoding="utf-8"?>
 <p:sld xmlns:a="http://schemas.openxmlformats.org/drawingml/2006/main" xmlns:r="http://schemas.openxmlformats.org/officeDocument/2006/relationships" xmlns:p="http://schemas.openxmlformats.org/presentationml/2006/main">
   <p:cSld>
@@ -5370,7 +5158,15 @@
             <a:pPr lvl="1"/>
             <a:r>
               <a:rPr lang="en-GB" dirty="0"/>
-              <a:t>Given a realistic description of a Streaming Data Engineering problem, </a:t>
+              <a:t>Given a realistic </a:t>
+            </a:r>
+            <a:r>
+              <a:rPr lang="en-GB" b="1" dirty="0"/>
+              <a:t>Streaming Data Engineering problem</a:t>
+            </a:r>
+            <a:r>
+              <a:rPr lang="en-GB" dirty="0"/>
+              <a:t>, </a:t>
             </a:r>
             <a:r>
               <a:rPr lang="en-GB" b="1" dirty="0"/>
@@ -5644,13 +5440,13 @@
           <a:p>
             <a:r>
               <a:rPr lang="en-GB" dirty="0"/>
-              <a:t>Which are the three approaches to tame velocity? Compare and contrast two of them</a:t>
+              <a:t>Which are the three approaches to tame velocity? List them all before comparing and contrasting two of them</a:t>
             </a:r>
           </a:p>
           <a:p>
             <a:r>
               <a:rPr lang="en-GB" dirty="0"/>
-              <a:t>Which are the three time-models we introduced? Compare and contrast two of them</a:t>
+              <a:t>Which are the three time-models we introduced? List them all before comparing and contrasting two of them</a:t>
             </a:r>
           </a:p>
           <a:p>
@@ -5670,7 +5466,7 @@
           <a:p>
             <a:r>
               <a:rPr lang="en-GB" dirty="0"/>
-              <a:t>Which are the types of operations in spark? Illustrate them with an example.</a:t>
+              <a:t>Which are the types of operations in spark? Illustrate them with a run-time example.</a:t>
             </a:r>
           </a:p>
           <a:p>
@@ -5879,9 +5675,21 @@
         </p:spPr>
         <p:txBody>
           <a:bodyPr>
-            <a:normAutofit fontScale="55000" lnSpcReduction="20000"/>
+            <a:normAutofit fontScale="92500" lnSpcReduction="20000"/>
           </a:bodyPr>
           <a:lstStyle/>
+          <a:p>
+            <a:r>
+              <a:rPr lang="en-GB" dirty="0"/>
+              <a:t>What’s the difference between the stream-only and the absolute time models? Explain it, proposing examples of queries that can be answered in both models and queries that can be answered only with the absolute time model.</a:t>
+            </a:r>
+          </a:p>
+          <a:p>
+            <a:r>
+              <a:rPr lang="en-GB" dirty="0"/>
+              <a:t>What’s the difference between the absolute and the interval-based time models? Explain it, proposing examples of queries that can be answered in both models and queries that can be answered only with the interval-based time model.</a:t>
+            </a:r>
+          </a:p>
           <a:p>
             <a:r>
               <a:rPr lang="en-GB" dirty="0"/>
@@ -5891,98 +5699,8 @@
           <a:p>
             <a:r>
               <a:rPr lang="en-GB" dirty="0"/>
-              <a:t>What’s the difference between the stream-only and the absolute time models? Explain it, proposing examples of queries that can be answered in both models and queries that can be answered only with the absolute time model.</a:t>
-            </a:r>
-          </a:p>
-          <a:p>
-            <a:r>
-              <a:rPr lang="en-GB" dirty="0"/>
-              <a:t>What’s the difference between the absolute and the interval-based time models? Explain it, proposing examples of queries that can be answered in both models and queries that can be answered only with the interval-based time model.</a:t>
-            </a:r>
-          </a:p>
-          <a:p>
-            <a:r>
-              <a:rPr lang="en-GB" dirty="0"/>
-              <a:t>What is a sliding logical window? Given an example in EPL and in another language of your choice. </a:t>
-            </a:r>
-          </a:p>
-          <a:p>
-            <a:r>
-              <a:rPr lang="en-GB" dirty="0"/>
-              <a:t>What is a tumbling logical window? Given an example in EPL and in another language of your choice. </a:t>
-            </a:r>
-          </a:p>
-          <a:p>
-            <a:r>
-              <a:rPr lang="en-GB" dirty="0"/>
-              <a:t>What is a session window? Given an example in </a:t>
-            </a:r>
-            <a:r>
-              <a:rPr lang="en-GB" dirty="0" err="1"/>
-              <a:t>ksqlDB</a:t>
-            </a:r>
-            <a:endParaRPr lang="en-GB" dirty="0"/>
-          </a:p>
-          <a:p>
-            <a:r>
-              <a:rPr lang="en-GB" dirty="0"/>
-              <a:t>What is the role of the output clause in EPL? Given an example that supports your explanation.</a:t>
-            </a:r>
-          </a:p>
-          <a:p>
-            <a:r>
-              <a:rPr lang="en-GB" dirty="0"/>
-              <a:t>What’s the difference between transformations and actions in spark?</a:t>
-            </a:r>
-          </a:p>
-          <a:p>
-            <a:r>
-              <a:rPr lang="en-GB" dirty="0"/>
-              <a:t>What’s the difference between narrow and wide transformations in spark?</a:t>
-            </a:r>
-          </a:p>
-          <a:p>
-            <a:r>
-              <a:rPr lang="en-GB" dirty="0"/>
-              <a:t>What’s the role of watermarking in spark structured streaming? Support your claims with an example.</a:t>
-            </a:r>
-          </a:p>
-          <a:p>
-            <a:r>
-              <a:rPr lang="en-GB" dirty="0"/>
-              <a:t>What’s the role of a broker in Kafka?</a:t>
-            </a:r>
-          </a:p>
-          <a:p>
-            <a:r>
-              <a:rPr lang="en-GB" dirty="0"/>
-              <a:t>What’s a partition in Kafka?</a:t>
-            </a:r>
-          </a:p>
-          <a:p>
-            <a:r>
-              <a:rPr lang="en-GB" dirty="0"/>
-              <a:t>What’s the difference among a </a:t>
-            </a:r>
-            <a:r>
-              <a:rPr lang="en-GB" dirty="0" err="1"/>
-              <a:t>Kstream</a:t>
-            </a:r>
-            <a:r>
-              <a:rPr lang="en-GB" dirty="0"/>
-              <a:t>, a </a:t>
-            </a:r>
-            <a:r>
-              <a:rPr lang="en-GB" dirty="0" err="1"/>
-              <a:t>Ktable</a:t>
-            </a:r>
-            <a:r>
-              <a:rPr lang="en-GB" dirty="0"/>
-              <a:t> and a topic? Give an example.</a:t>
-            </a:r>
-          </a:p>
-          <a:p>
-            <a:endParaRPr lang="en-GB" dirty="0"/>
+              <a:t>What is a sliding logical window? Give an example at the conceptual level and show that you know both the EPL syntax and that of another language of your choice. </a:t>
+            </a:r>
           </a:p>
           <a:p>
             <a:endParaRPr lang="en-GB" dirty="0"/>
@@ -6098,62 +5816,39 @@
         <p:spPr/>
         <p:txBody>
           <a:bodyPr>
-            <a:normAutofit fontScale="90000"/>
+            <a:normAutofit/>
           </a:bodyPr>
           <a:lstStyle/>
           <a:p>
             <a:r>
-              <a:rPr lang="it-IT" sz="3600" dirty="0"/>
-              <a:t>Close book </a:t>
-            </a:r>
-            <a:r>
-              <a:rPr lang="it-IT" sz="3600" dirty="0" err="1"/>
-              <a:t>exam</a:t>
-            </a:r>
-            <a:r>
-              <a:rPr lang="it-IT" sz="3600" dirty="0"/>
+              <a:rPr lang="it-IT" sz="4000" b="1" dirty="0" err="1"/>
+              <a:t>Questions</a:t>
+            </a:r>
+            <a:r>
+              <a:rPr lang="it-IT" sz="4000" dirty="0"/>
+              <a:t> to test the </a:t>
+            </a:r>
+            <a:r>
+              <a:rPr lang="en-GB" sz="4000" b="1" dirty="0"/>
+              <a:t>depth</a:t>
+            </a:r>
+            <a:r>
+              <a:rPr lang="it-IT" sz="4000" dirty="0"/>
+              <a:t> of </a:t>
+            </a:r>
+            <a:r>
+              <a:rPr lang="it-IT" sz="4000" dirty="0" err="1"/>
+              <a:t>your</a:t>
+            </a:r>
+            <a:r>
+              <a:rPr lang="it-IT" sz="4000" dirty="0"/>
               <a:t> </a:t>
             </a:r>
             <a:r>
-              <a:rPr lang="it-IT" sz="3600" dirty="0" err="1"/>
-              <a:t>content</a:t>
-            </a:r>
-            <a:r>
-              <a:rPr lang="it-IT" sz="3600" dirty="0"/>
-              <a:t> </a:t>
-            </a:r>
-            <a:br>
-              <a:rPr lang="it-IT" dirty="0"/>
-            </a:br>
-            <a:r>
-              <a:rPr lang="it-IT" b="1" dirty="0" err="1"/>
-              <a:t>Questions</a:t>
-            </a:r>
-            <a:r>
-              <a:rPr lang="it-IT" dirty="0"/>
-              <a:t> to test the </a:t>
-            </a:r>
-            <a:r>
-              <a:rPr lang="en-GB" b="1" dirty="0"/>
-              <a:t>depth</a:t>
-            </a:r>
-            <a:r>
-              <a:rPr lang="it-IT" dirty="0"/>
-              <a:t> of </a:t>
-            </a:r>
-            <a:r>
-              <a:rPr lang="it-IT" dirty="0" err="1"/>
-              <a:t>your</a:t>
-            </a:r>
-            <a:r>
-              <a:rPr lang="it-IT" dirty="0"/>
-              <a:t> </a:t>
-            </a:r>
-            <a:r>
-              <a:rPr lang="it-IT" dirty="0" err="1"/>
+              <a:rPr lang="it-IT" sz="4000" dirty="0" err="1"/>
               <a:t>knowledge</a:t>
             </a:r>
-            <a:endParaRPr lang="it-IT" dirty="0"/>
+            <a:endParaRPr lang="it-IT" sz="4000" dirty="0"/>
           </a:p>
         </p:txBody>
       </p:sp>
@@ -6181,127 +5876,57 @@
         </p:spPr>
         <p:txBody>
           <a:bodyPr>
-            <a:normAutofit/>
+            <a:normAutofit fontScale="92500" lnSpcReduction="20000"/>
           </a:bodyPr>
           <a:lstStyle/>
           <a:p>
             <a:r>
-              <a:rPr lang="en-GB" b="1" dirty="0"/>
-              <a:t>e.g. </a:t>
-            </a:r>
-          </a:p>
-          <a:p>
-            <a:pPr lvl="1"/>
-            <a:r>
               <a:rPr lang="en-GB" dirty="0"/>
-              <a:t>What’s the difference between a pull and a push query in KSQLDB?</a:t>
-            </a:r>
-          </a:p>
-          <a:p>
-            <a:pPr lvl="1"/>
+              <a:t>What is a tumbling logical window? Give an example at the conceptual level and show that you know both the EPL syntax and that of another language of your choice. </a:t>
+            </a:r>
+          </a:p>
+          <a:p>
             <a:r>
               <a:rPr lang="en-GB" dirty="0"/>
-              <a:t>What’s the difference between a tag and a field in </a:t>
+              <a:t>What is a tumbling </a:t>
             </a:r>
             <a:r>
               <a:rPr lang="en-GB" dirty="0" err="1"/>
-              <a:t>InfluxDB</a:t>
+              <a:t>tubling</a:t>
             </a:r>
             <a:r>
               <a:rPr lang="en-GB" dirty="0"/>
-              <a:t> data model?</a:t>
-            </a:r>
-          </a:p>
-          <a:p>
-            <a:pPr lvl="1"/>
+              <a:t> window? Give an example at the conceptual level and show that you know both the EPL syntax and that of another language of your choice. </a:t>
+            </a:r>
+          </a:p>
+          <a:p>
             <a:r>
               <a:rPr lang="en-GB" dirty="0"/>
-              <a:t>What shall you do to join to time-series in </a:t>
-            </a:r>
-            <a:r>
-              <a:rPr lang="en-GB" dirty="0" err="1"/>
-              <a:t>InfluxDB</a:t>
-            </a:r>
+              <a:t>What is the role of the output clause in EPL? Give an example that supports your explanation.</a:t>
+            </a:r>
+          </a:p>
+          <a:p>
             <a:r>
               <a:rPr lang="en-GB" dirty="0"/>
-              <a:t>? Why?</a:t>
-            </a:r>
-          </a:p>
-          <a:p>
-            <a:pPr lvl="1"/>
+              <a:t>What’s the difference between transformations and actions in spark?</a:t>
+            </a:r>
+          </a:p>
+          <a:p>
             <a:r>
               <a:rPr lang="en-GB" dirty="0"/>
-              <a:t>What is a concept drift detector? Illustrate how one of them works.</a:t>
-            </a:r>
-          </a:p>
-          <a:p>
-            <a:pPr lvl="1"/>
+              <a:t>What’s the difference between narrow and wide transformations in spark?</a:t>
+            </a:r>
+          </a:p>
+          <a:p>
             <a:r>
               <a:rPr lang="en-GB" dirty="0"/>
-              <a:t>How does ADWIN detect a concept drift?</a:t>
-            </a:r>
-          </a:p>
-          <a:p>
-            <a:pPr lvl="1"/>
-            <a:r>
-              <a:rPr lang="en-GB" dirty="0"/>
-              <a:t>How does the SML version of KNN work?</a:t>
-            </a:r>
-          </a:p>
-          <a:p>
-            <a:pPr lvl="1"/>
-            <a:r>
-              <a:rPr lang="en-US" dirty="0">
-                <a:latin typeface="Calibri" panose="020F0502020204030204" pitchFamily="34" charset="0"/>
-                <a:cs typeface="Calibri" panose="020F0502020204030204" pitchFamily="34" charset="0"/>
-              </a:rPr>
-              <a:t>Why is </a:t>
-            </a:r>
-            <a:r>
-              <a:rPr lang="en-US" dirty="0" err="1">
-                <a:latin typeface="Calibri" panose="020F0502020204030204" pitchFamily="34" charset="0"/>
-                <a:cs typeface="Calibri" panose="020F0502020204030204" pitchFamily="34" charset="0"/>
-              </a:rPr>
-              <a:t>Hoeffding</a:t>
-            </a:r>
-            <a:r>
-              <a:rPr lang="en-US" dirty="0">
-                <a:latin typeface="Calibri" panose="020F0502020204030204" pitchFamily="34" charset="0"/>
-                <a:cs typeface="Calibri" panose="020F0502020204030204" pitchFamily="34" charset="0"/>
-              </a:rPr>
-              <a:t> Bound used in SML to build a decision tree?</a:t>
-            </a:r>
-          </a:p>
-          <a:p>
-            <a:pPr lvl="1"/>
-            <a:r>
-              <a:rPr lang="en-US" dirty="0">
-                <a:latin typeface="Calibri" panose="020F0502020204030204" pitchFamily="34" charset="0"/>
-                <a:cs typeface="Calibri" panose="020F0502020204030204" pitchFamily="34" charset="0"/>
-              </a:rPr>
-              <a:t>What’s the difference between an additive and a multiplicative model for time series decomposition? </a:t>
-            </a:r>
-          </a:p>
-          <a:p>
-            <a:pPr lvl="1"/>
-            <a:r>
-              <a:rPr lang="en-US" dirty="0">
-                <a:latin typeface="Calibri" panose="020F0502020204030204" pitchFamily="34" charset="0"/>
-                <a:cs typeface="Calibri" panose="020F0502020204030204" pitchFamily="34" charset="0"/>
-              </a:rPr>
-              <a:t>Given a line chart that illustrate a time series, tell if it is stationary and why</a:t>
-            </a:r>
-          </a:p>
-          <a:p>
-            <a:pPr lvl="1"/>
+              <a:t>What’s the role of watermarking in Spark Structured Streaming? Support your claims with an example.</a:t>
+            </a:r>
+          </a:p>
+          <a:p>
             <a:endParaRPr lang="en-GB" dirty="0"/>
           </a:p>
           <a:p>
-            <a:pPr lvl="1"/>
-            <a:endParaRPr lang="en-GB" dirty="0"/>
-          </a:p>
-          <a:p>
-            <a:pPr lvl="1"/>
             <a:endParaRPr lang="en-GB" dirty="0"/>
           </a:p>
         </p:txBody>
@@ -6366,7 +5991,7 @@
     </p:spTree>
     <p:extLst>
       <p:ext uri="{BB962C8B-B14F-4D97-AF65-F5344CB8AC3E}">
-        <p14:creationId xmlns:p14="http://schemas.microsoft.com/office/powerpoint/2010/main" val="356033668"/>
+        <p14:creationId xmlns:p14="http://schemas.microsoft.com/office/powerpoint/2010/main" val="2904052911"/>
       </p:ext>
     </p:extLst>
   </p:cSld>
@@ -6412,62 +6037,39 @@
         <p:spPr/>
         <p:txBody>
           <a:bodyPr>
-            <a:normAutofit fontScale="90000"/>
+            <a:normAutofit/>
           </a:bodyPr>
           <a:lstStyle/>
           <a:p>
             <a:r>
-              <a:rPr lang="it-IT" sz="3600" dirty="0"/>
-              <a:t>Close book </a:t>
-            </a:r>
-            <a:r>
-              <a:rPr lang="it-IT" sz="3600" dirty="0" err="1"/>
-              <a:t>exam</a:t>
-            </a:r>
-            <a:r>
-              <a:rPr lang="it-IT" sz="3600" dirty="0"/>
+              <a:rPr lang="it-IT" sz="4000" b="1" dirty="0" err="1"/>
+              <a:t>Questions</a:t>
+            </a:r>
+            <a:r>
+              <a:rPr lang="it-IT" sz="4000" dirty="0"/>
+              <a:t> to test the </a:t>
+            </a:r>
+            <a:r>
+              <a:rPr lang="en-GB" sz="4000" b="1" dirty="0"/>
+              <a:t>depth</a:t>
+            </a:r>
+            <a:r>
+              <a:rPr lang="it-IT" sz="4000" dirty="0"/>
+              <a:t> of </a:t>
+            </a:r>
+            <a:r>
+              <a:rPr lang="it-IT" sz="4000" dirty="0" err="1"/>
+              <a:t>your</a:t>
+            </a:r>
+            <a:r>
+              <a:rPr lang="it-IT" sz="4000" dirty="0"/>
               <a:t> </a:t>
             </a:r>
             <a:r>
-              <a:rPr lang="it-IT" sz="3600" dirty="0" err="1"/>
-              <a:t>content</a:t>
-            </a:r>
-            <a:r>
-              <a:rPr lang="it-IT" sz="3600" dirty="0"/>
-              <a:t> </a:t>
-            </a:r>
-            <a:br>
-              <a:rPr lang="it-IT" dirty="0"/>
-            </a:br>
-            <a:r>
-              <a:rPr lang="it-IT" b="1" dirty="0" err="1"/>
-              <a:t>Questions</a:t>
-            </a:r>
-            <a:r>
-              <a:rPr lang="it-IT" dirty="0"/>
-              <a:t> to test the </a:t>
-            </a:r>
-            <a:r>
-              <a:rPr lang="en-GB" b="1" dirty="0"/>
-              <a:t>depth</a:t>
-            </a:r>
-            <a:r>
-              <a:rPr lang="it-IT" dirty="0"/>
-              <a:t> of </a:t>
-            </a:r>
-            <a:r>
-              <a:rPr lang="it-IT" dirty="0" err="1"/>
-              <a:t>your</a:t>
-            </a:r>
-            <a:r>
-              <a:rPr lang="it-IT" dirty="0"/>
-              <a:t> </a:t>
-            </a:r>
-            <a:r>
-              <a:rPr lang="it-IT" dirty="0" err="1"/>
+              <a:rPr lang="it-IT" sz="4000" dirty="0" err="1"/>
               <a:t>knowledge</a:t>
             </a:r>
-            <a:endParaRPr lang="it-IT" dirty="0"/>
+            <a:endParaRPr lang="it-IT" sz="4000" dirty="0"/>
           </a:p>
         </p:txBody>
       </p:sp>
@@ -6495,70 +6097,76 @@
         </p:spPr>
         <p:txBody>
           <a:bodyPr>
-            <a:normAutofit/>
+            <a:normAutofit fontScale="92500" lnSpcReduction="10000"/>
           </a:bodyPr>
           <a:lstStyle/>
           <a:p>
             <a:r>
-              <a:rPr lang="en-GB" b="1" dirty="0"/>
-              <a:t>e.g. </a:t>
-            </a:r>
-          </a:p>
-          <a:p>
-            <a:pPr lvl="1"/>
-            <a:r>
               <a:rPr lang="en-GB" dirty="0"/>
-              <a:t>Why is exponential smoothing named in this way?</a:t>
-            </a:r>
-          </a:p>
-          <a:p>
-            <a:pPr lvl="1"/>
+              <a:t>What’s the role of a topic in Kafka?</a:t>
+            </a:r>
+          </a:p>
+          <a:p>
             <a:r>
               <a:rPr lang="en-GB" dirty="0"/>
-              <a:t>What’s the difference between simple, double and triple exponential smoothing?</a:t>
-            </a:r>
-          </a:p>
-          <a:p>
-            <a:pPr lvl="1"/>
+              <a:t>What’s the role of a broker in Kafka?</a:t>
+            </a:r>
+          </a:p>
+          <a:p>
             <a:r>
               <a:rPr lang="en-GB" dirty="0"/>
-              <a:t>What’s the difference between the meaning of moving average in time series decomposition and in ARMA models?</a:t>
-            </a:r>
-          </a:p>
-          <a:p>
-            <a:pPr lvl="1"/>
+              <a:t>What’s the role of a partition in Kafka?</a:t>
+            </a:r>
+          </a:p>
+          <a:p>
             <a:r>
               <a:rPr lang="en-GB" dirty="0"/>
-              <a:t>What’s the definition of Autocorrelation? How does it differ from the definition of correlation?</a:t>
-            </a:r>
-          </a:p>
-          <a:p>
-            <a:pPr lvl="1"/>
+              <a:t>What’s the relationship between a consumer, a topic, a broker, a partition, a consumer and a consumer group in Kafka? Explain it using an example.</a:t>
+            </a:r>
+          </a:p>
+          <a:p>
             <a:r>
               <a:rPr lang="en-GB" dirty="0"/>
-              <a:t>Given an Autocorrelation function plot, tell what you read.</a:t>
-            </a:r>
-          </a:p>
-          <a:p>
-            <a:pPr lvl="1"/>
+              <a:t>What’s the difference among a </a:t>
+            </a:r>
+            <a:r>
+              <a:rPr lang="en-GB" dirty="0" err="1"/>
+              <a:t>Kstream</a:t>
+            </a:r>
             <a:r>
               <a:rPr lang="en-GB" dirty="0"/>
-              <a:t>What’s the difference between the AR and the MA part of an ARMA model?</a:t>
-            </a:r>
-          </a:p>
-          <a:p>
-            <a:pPr lvl="1"/>
+              <a:t>, a </a:t>
+            </a:r>
+            <a:r>
+              <a:rPr lang="en-GB" dirty="0" err="1"/>
+              <a:t>Ktable</a:t>
+            </a:r>
             <a:r>
               <a:rPr lang="en-GB" dirty="0"/>
-              <a:t>Describe the Box-Jenkins Methodology for ARIMA models</a:t>
-            </a:r>
-          </a:p>
-          <a:p>
-            <a:pPr lvl="1"/>
-            <a:endParaRPr lang="en-GB" dirty="0"/>
-          </a:p>
-          <a:p>
-            <a:pPr lvl="1"/>
+              <a:t> and a topic? Give an example.</a:t>
+            </a:r>
+          </a:p>
+          <a:p>
+            <a:r>
+              <a:rPr lang="en-GB" dirty="0"/>
+              <a:t>What is a session window? Give an example at the conceptual level and show that you know the </a:t>
+            </a:r>
+            <a:r>
+              <a:rPr lang="en-GB" dirty="0" err="1"/>
+              <a:t>ksqlDB</a:t>
+            </a:r>
+            <a:r>
+              <a:rPr lang="en-GB" dirty="0"/>
+              <a:t> syntax</a:t>
+            </a:r>
+          </a:p>
+          <a:p>
+            <a:r>
+              <a:rPr lang="en-GB" dirty="0"/>
+              <a:t>What’s the difference between a pull and a push query in KSQLDB?</a:t>
+            </a:r>
+          </a:p>
+          <a:p>
             <a:endParaRPr lang="en-GB" dirty="0"/>
           </a:p>
         </p:txBody>
@@ -6623,7 +6231,7 @@
     </p:spTree>
     <p:extLst>
       <p:ext uri="{BB962C8B-B14F-4D97-AF65-F5344CB8AC3E}">
-        <p14:creationId xmlns:p14="http://schemas.microsoft.com/office/powerpoint/2010/main" val="4041868519"/>
+        <p14:creationId xmlns:p14="http://schemas.microsoft.com/office/powerpoint/2010/main" val="356033668"/>
       </p:ext>
     </p:extLst>
   </p:cSld>
@@ -6674,29 +6282,6 @@
           <a:lstStyle/>
           <a:p>
             <a:r>
-              <a:rPr lang="it-IT" sz="3600" dirty="0"/>
-              <a:t>Close book </a:t>
-            </a:r>
-            <a:r>
-              <a:rPr lang="it-IT" sz="3600" dirty="0" err="1"/>
-              <a:t>exam</a:t>
-            </a:r>
-            <a:r>
-              <a:rPr lang="it-IT" sz="3600" dirty="0"/>
-              <a:t> </a:t>
-            </a:r>
-            <a:r>
-              <a:rPr lang="it-IT" sz="3600" dirty="0" err="1"/>
-              <a:t>content</a:t>
-            </a:r>
-            <a:r>
-              <a:rPr lang="it-IT" sz="3600" dirty="0"/>
-              <a:t> </a:t>
-            </a:r>
-            <a:br>
-              <a:rPr lang="it-IT" dirty="0"/>
-            </a:br>
-            <a:r>
               <a:rPr lang="en-GB" b="1" dirty="0"/>
               <a:t>Exercises</a:t>
             </a:r>
@@ -6736,7 +6321,7 @@
         </p:spPr>
         <p:txBody>
           <a:bodyPr>
-            <a:normAutofit/>
+            <a:normAutofit fontScale="92500" lnSpcReduction="10000"/>
           </a:bodyPr>
           <a:lstStyle/>
           <a:p>
@@ -6815,19 +6400,62 @@
           <a:p>
             <a:r>
               <a:rPr lang="en-GB" dirty="0"/>
-              <a:t>When does such a pattern match? </a:t>
+              <a:t>Translate the pattern into an English sentence</a:t>
             </a:r>
           </a:p>
           <a:p>
             <a:r>
               <a:rPr lang="en-GB" dirty="0"/>
-              <a:t>Which are the events that trigger the matching? </a:t>
+              <a:t>Which are the events that trigger the matching? Why?</a:t>
             </a:r>
           </a:p>
           <a:p>
             <a:r>
               <a:rPr lang="en-GB" dirty="0"/>
-              <a:t>Why?</a:t>
+              <a:t>Which are the events that may trigger the matching but are excluded by the semantics of the </a:t>
+            </a:r>
+            <a:r>
+              <a:rPr lang="en-GB" sz="2600" dirty="0">
+                <a:latin typeface="Courier New" panose="02070309020205020404" pitchFamily="49" charset="0"/>
+                <a:cs typeface="Courier New" panose="02070309020205020404" pitchFamily="49" charset="0"/>
+              </a:rPr>
+              <a:t>every</a:t>
+            </a:r>
+            <a:r>
+              <a:rPr lang="en-GB" sz="2800" dirty="0">
+                <a:latin typeface="Courier New" panose="02070309020205020404" pitchFamily="49" charset="0"/>
+                <a:cs typeface="Courier New" panose="02070309020205020404" pitchFamily="49" charset="0"/>
+              </a:rPr>
+              <a:t> </a:t>
+            </a:r>
+            <a:r>
+              <a:rPr lang="en-GB" dirty="0"/>
+              <a:t>and the </a:t>
+            </a:r>
+            <a:r>
+              <a:rPr lang="en-GB" sz="2600" dirty="0">
+                <a:latin typeface="Courier New" panose="02070309020205020404" pitchFamily="49" charset="0"/>
+                <a:cs typeface="Courier New" panose="02070309020205020404" pitchFamily="49" charset="0"/>
+              </a:rPr>
+              <a:t>where </a:t>
+            </a:r>
+            <a:r>
+              <a:rPr lang="en-GB" sz="2600" dirty="0" err="1">
+                <a:latin typeface="Courier New" panose="02070309020205020404" pitchFamily="49" charset="0"/>
+                <a:cs typeface="Courier New" panose="02070309020205020404" pitchFamily="49" charset="0"/>
+              </a:rPr>
+              <a:t>timer:within</a:t>
+            </a:r>
+            <a:r>
+              <a:rPr lang="en-GB" sz="2600" dirty="0">
+                <a:latin typeface="Courier New" panose="02070309020205020404" pitchFamily="49" charset="0"/>
+                <a:cs typeface="Courier New" panose="02070309020205020404" pitchFamily="49" charset="0"/>
+              </a:rPr>
+              <a:t> </a:t>
+            </a:r>
+            <a:r>
+              <a:rPr lang="en-GB" dirty="0"/>
+              <a:t>clauses? Why?</a:t>
             </a:r>
           </a:p>
           <a:p>
@@ -6938,7 +6566,12 @@
             <p:ph type="title"/>
           </p:nvPr>
         </p:nvSpPr>
-        <p:spPr/>
+        <p:spPr>
+          <a:xfrm>
+            <a:off x="838199" y="365125"/>
+            <a:ext cx="10791091" cy="1325563"/>
+          </a:xfrm>
+        </p:spPr>
         <p:txBody>
           <a:bodyPr>
             <a:normAutofit/>
@@ -6946,41 +6579,18 @@
           <a:lstStyle/>
           <a:p>
             <a:r>
-              <a:rPr lang="it-IT" sz="3600" dirty="0"/>
-              <a:t>Close book </a:t>
-            </a:r>
-            <a:r>
-              <a:rPr lang="it-IT" sz="3600" dirty="0" err="1"/>
-              <a:t>exam</a:t>
-            </a:r>
-            <a:r>
-              <a:rPr lang="it-IT" sz="3600" dirty="0"/>
-              <a:t> </a:t>
-            </a:r>
-            <a:r>
-              <a:rPr lang="it-IT" sz="3600" dirty="0" err="1"/>
-              <a:t>content</a:t>
-            </a:r>
-            <a:r>
-              <a:rPr lang="it-IT" sz="3600" dirty="0"/>
-              <a:t> </a:t>
-            </a:r>
-            <a:br>
-              <a:rPr lang="it-IT" dirty="0"/>
-            </a:br>
-            <a:r>
-              <a:rPr lang="en-GB" b="1" dirty="0"/>
+              <a:rPr lang="en-GB" sz="4000" b="1" dirty="0"/>
               <a:t>Exercises</a:t>
             </a:r>
             <a:r>
-              <a:rPr lang="en-GB" dirty="0"/>
+              <a:rPr lang="en-GB" sz="4000" dirty="0"/>
               <a:t> on </a:t>
             </a:r>
             <a:r>
-              <a:rPr lang="en-GB" b="1" dirty="0"/>
-              <a:t>continuous queries</a:t>
-            </a:r>
-            <a:endParaRPr lang="it-IT" b="1" dirty="0"/>
+              <a:rPr lang="en-GB" sz="4000" b="1" dirty="0"/>
+              <a:t>a Streaming Data Engineering problem</a:t>
+            </a:r>
+            <a:endParaRPr lang="it-IT" sz="4000" b="1" dirty="0"/>
           </a:p>
         </p:txBody>
       </p:sp>
@@ -7008,125 +6618,55 @@
         </p:spPr>
         <p:txBody>
           <a:bodyPr>
-            <a:normAutofit fontScale="92500" lnSpcReduction="10000"/>
+            <a:normAutofit/>
           </a:bodyPr>
           <a:lstStyle/>
           <a:p>
             <a:r>
               <a:rPr lang="en-GB" dirty="0"/>
-              <a:t>Let’s assume to be at the exit of an airport. There are multiple sliding door. Each door opens when a person is exiting from the airport. Let’s also assume that the door is equipped with a sensors that tells every second how the door is sliding by streaming the following two types of observations:</a:t>
-            </a:r>
-          </a:p>
-          <a:p>
-            <a:pPr marL="0" indent="0" algn="ctr">
-              <a:buNone/>
-            </a:pPr>
-            <a:r>
-              <a:rPr lang="en-GB" sz="2200" dirty="0">
-                <a:latin typeface="Courier New" panose="02070309020205020404" pitchFamily="49" charset="0"/>
-                <a:cs typeface="Courier New" panose="02070309020205020404" pitchFamily="49" charset="0"/>
+              <a:t>In the git repo of the course you find a complete example about a Robotic Arm solved in</a:t>
+            </a:r>
+          </a:p>
+          <a:p>
+            <a:pPr lvl="1"/>
+            <a:r>
+              <a:rPr lang="en-GB" dirty="0"/>
+              <a:t>EPL</a:t>
+            </a:r>
+          </a:p>
+          <a:p>
+            <a:pPr lvl="1"/>
+            <a:r>
+              <a:rPr lang="en-GB" dirty="0"/>
+              <a:t>Spark Structured Streaming</a:t>
+            </a:r>
+          </a:p>
+          <a:p>
+            <a:pPr lvl="1"/>
+            <a:r>
+              <a:rPr lang="en-GB" dirty="0" err="1"/>
+              <a:t>ksqlDB</a:t>
+            </a:r>
+            <a:endParaRPr lang="en-GB" dirty="0"/>
+          </a:p>
+          <a:p>
+            <a:r>
+              <a:rPr lang="en-GB" dirty="0"/>
+              <a:t>There is also another example completely solved in EPL about drones picking tomatoes</a:t>
+            </a:r>
+          </a:p>
+          <a:p>
+            <a:pPr lvl="1"/>
+            <a:r>
+              <a:rPr lang="en-GB" sz="1800" dirty="0">
+                <a:hlinkClick r:id="rId2"/>
               </a:rPr>
-              <a:t>create schema </a:t>
-            </a:r>
-            <a:r>
-              <a:rPr lang="en-GB" sz="2200" dirty="0" err="1">
-                <a:latin typeface="Courier New" panose="02070309020205020404" pitchFamily="49" charset="0"/>
-                <a:cs typeface="Courier New" panose="02070309020205020404" pitchFamily="49" charset="0"/>
-              </a:rPr>
-              <a:t>DoorOpening</a:t>
-            </a:r>
-            <a:r>
-              <a:rPr lang="en-GB" sz="2200" dirty="0">
-                <a:latin typeface="Courier New" panose="02070309020205020404" pitchFamily="49" charset="0"/>
-                <a:cs typeface="Courier New" panose="02070309020205020404" pitchFamily="49" charset="0"/>
-              </a:rPr>
-              <a:t>(</a:t>
-            </a:r>
-            <a:r>
-              <a:rPr lang="en-GB" sz="2200" dirty="0" err="1">
-                <a:latin typeface="Courier New" panose="02070309020205020404" pitchFamily="49" charset="0"/>
-                <a:cs typeface="Courier New" panose="02070309020205020404" pitchFamily="49" charset="0"/>
-              </a:rPr>
-              <a:t>doorId</a:t>
-            </a:r>
-            <a:r>
-              <a:rPr lang="en-GB" sz="2200" dirty="0">
-                <a:latin typeface="Courier New" panose="02070309020205020404" pitchFamily="49" charset="0"/>
-                <a:cs typeface="Courier New" panose="02070309020205020404" pitchFamily="49" charset="0"/>
-              </a:rPr>
-              <a:t> int);</a:t>
-            </a:r>
-          </a:p>
-          <a:p>
-            <a:pPr marL="0" indent="0" algn="ctr">
-              <a:buNone/>
-            </a:pPr>
-            <a:r>
-              <a:rPr lang="en-GB" sz="2200" dirty="0">
-                <a:latin typeface="Courier New" panose="02070309020205020404" pitchFamily="49" charset="0"/>
-                <a:cs typeface="Courier New" panose="02070309020205020404" pitchFamily="49" charset="0"/>
-              </a:rPr>
-              <a:t>create schema </a:t>
-            </a:r>
-            <a:r>
-              <a:rPr lang="en-GB" sz="2200" dirty="0" err="1">
-                <a:latin typeface="Courier New" panose="02070309020205020404" pitchFamily="49" charset="0"/>
-                <a:cs typeface="Courier New" panose="02070309020205020404" pitchFamily="49" charset="0"/>
-              </a:rPr>
-              <a:t>DoorClosing</a:t>
-            </a:r>
-            <a:r>
-              <a:rPr lang="en-GB" sz="2200" dirty="0">
-                <a:latin typeface="Courier New" panose="02070309020205020404" pitchFamily="49" charset="0"/>
-                <a:cs typeface="Courier New" panose="02070309020205020404" pitchFamily="49" charset="0"/>
-              </a:rPr>
-              <a:t>(</a:t>
-            </a:r>
-            <a:r>
-              <a:rPr lang="en-GB" sz="2200" dirty="0" err="1">
-                <a:latin typeface="Courier New" panose="02070309020205020404" pitchFamily="49" charset="0"/>
-                <a:cs typeface="Courier New" panose="02070309020205020404" pitchFamily="49" charset="0"/>
-              </a:rPr>
-              <a:t>doorId</a:t>
-            </a:r>
-            <a:r>
-              <a:rPr lang="en-GB" sz="2200" dirty="0">
-                <a:latin typeface="Courier New" panose="02070309020205020404" pitchFamily="49" charset="0"/>
-                <a:cs typeface="Courier New" panose="02070309020205020404" pitchFamily="49" charset="0"/>
-              </a:rPr>
-              <a:t> int);</a:t>
-            </a:r>
-          </a:p>
-          <a:p>
-            <a:r>
-              <a:rPr lang="en-GB" dirty="0"/>
-              <a:t>formalize it in EPL and in a language of your choice among KSQL, Spark Structured Streaming and Flux the following continuous query: </a:t>
-            </a:r>
-          </a:p>
-          <a:p>
-            <a:pPr marL="0" indent="0" algn="ctr">
-              <a:buNone/>
-            </a:pPr>
-            <a:r>
-              <a:rPr lang="en-GB" i="1" dirty="0"/>
-              <a:t>tell every minute for how many seconds was the door opening </a:t>
-            </a:r>
-            <a:br>
-              <a:rPr lang="en-GB" i="1" dirty="0"/>
-            </a:br>
-            <a:r>
-              <a:rPr lang="en-GB" i="1" dirty="0"/>
-              <a:t>in the last 2 minutes. </a:t>
-            </a:r>
-          </a:p>
-          <a:p>
-            <a:r>
-              <a:rPr lang="en-GB" dirty="0"/>
-              <a:t>Explain your code in details</a:t>
-            </a:r>
-          </a:p>
-          <a:p>
-            <a:endParaRPr lang="en-GB" dirty="0"/>
+              <a:t>https://github.com/emanueledellavalle/streaming-data-analytics/tree/main/codes/epl_tomatopick</a:t>
+            </a:r>
+            <a:r>
+              <a:rPr lang="en-GB" sz="1800" dirty="0"/>
+              <a:t> </a:t>
+            </a:r>
           </a:p>
         </p:txBody>
       </p:sp>
@@ -7219,10 +6759,90 @@
       </p:grpSpPr>
       <p:sp>
         <p:nvSpPr>
-          <p:cNvPr id="9" name="Title 8">
-            <a:extLst>
-              <a:ext uri="{FF2B5EF4-FFF2-40B4-BE49-F238E27FC236}">
-                <a16:creationId xmlns:a16="http://schemas.microsoft.com/office/drawing/2014/main" id="{885E2613-CFFE-8746-BB6F-5FF859931508}"/>
+          <p:cNvPr id="2" name="Subtitle 1">
+            <a:extLst>
+              <a:ext uri="{FF2B5EF4-FFF2-40B4-BE49-F238E27FC236}">
+                <a16:creationId xmlns:a16="http://schemas.microsoft.com/office/drawing/2014/main" id="{5844CE45-509E-F649-90A4-98FCBA6E2423}"/>
+              </a:ext>
+            </a:extLst>
+          </p:cNvPr>
+          <p:cNvSpPr>
+            <a:spLocks noGrp="1"/>
+          </p:cNvSpPr>
+          <p:nvPr>
+            <p:ph type="subTitle" idx="1"/>
+          </p:nvPr>
+        </p:nvSpPr>
+        <p:spPr/>
+        <p:txBody>
+          <a:bodyPr/>
+          <a:lstStyle/>
+          <a:p>
+            <a:pPr marL="177796" indent="-177796">
+              <a:spcBef>
+                <a:spcPts val="0"/>
+              </a:spcBef>
+              <a:buClr>
+                <a:schemeClr val="lt1"/>
+              </a:buClr>
+              <a:buSzPts val="1800"/>
+            </a:pPr>
+            <a:r>
+              <a:rPr lang="en" b="1" dirty="0">
+                <a:solidFill>
+                  <a:schemeClr val="tx1"/>
+                </a:solidFill>
+                <a:latin typeface="Helvetica Neue Light"/>
+                <a:ea typeface="Helvetica Neue Light"/>
+                <a:cs typeface="Helvetica Neue Light"/>
+                <a:sym typeface="Helvetica Neue Light"/>
+              </a:rPr>
+              <a:t>Emanuele Della Valle</a:t>
+            </a:r>
+          </a:p>
+          <a:p>
+            <a:pPr marL="177796" indent="-177796">
+              <a:spcBef>
+                <a:spcPts val="0"/>
+              </a:spcBef>
+              <a:buClr>
+                <a:schemeClr val="lt1"/>
+              </a:buClr>
+              <a:buSzPts val="1800"/>
+            </a:pPr>
+            <a:r>
+              <a:rPr lang="en" sz="1800" dirty="0" err="1">
+                <a:solidFill>
+                  <a:schemeClr val="tx1"/>
+                </a:solidFill>
+                <a:latin typeface="Helvetica Neue Light"/>
+                <a:ea typeface="Helvetica Neue Light"/>
+                <a:cs typeface="Helvetica Neue Light"/>
+                <a:sym typeface="Helvetica Neue Light"/>
+              </a:rPr>
+              <a:t>Politecnico</a:t>
+            </a:r>
+            <a:r>
+              <a:rPr lang="en" sz="1800" dirty="0">
+                <a:solidFill>
+                  <a:schemeClr val="tx1"/>
+                </a:solidFill>
+                <a:latin typeface="Helvetica Neue Light"/>
+                <a:ea typeface="Helvetica Neue Light"/>
+                <a:cs typeface="Helvetica Neue Light"/>
+                <a:sym typeface="Helvetica Neue Light"/>
+              </a:rPr>
+              <a:t> di Milano </a:t>
+            </a:r>
+          </a:p>
+        </p:txBody>
+      </p:sp>
+      <p:sp>
+        <p:nvSpPr>
+          <p:cNvPr id="3" name="Title 2">
+            <a:extLst>
+              <a:ext uri="{FF2B5EF4-FFF2-40B4-BE49-F238E27FC236}">
+                <a16:creationId xmlns:a16="http://schemas.microsoft.com/office/drawing/2014/main" id="{05E3092D-C75E-7446-AFAD-75E4D4F36537}"/>
               </a:ext>
             </a:extLst>
           </p:cNvPr>
@@ -7231,270 +6851,133 @@
           </p:cNvSpPr>
           <p:nvPr>
             <p:ph type="title"/>
-          </p:nvPr>
-        </p:nvSpPr>
-        <p:spPr/>
-        <p:txBody>
-          <a:bodyPr>
-            <a:normAutofit/>
-          </a:bodyPr>
-          <a:lstStyle/>
-          <a:p>
-            <a:r>
-              <a:rPr lang="it-IT" sz="3600" dirty="0"/>
-              <a:t>Close book </a:t>
-            </a:r>
-            <a:r>
-              <a:rPr lang="it-IT" sz="3600" dirty="0" err="1"/>
-              <a:t>exam</a:t>
-            </a:r>
-            <a:r>
-              <a:rPr lang="it-IT" sz="3600" dirty="0"/>
-              <a:t> </a:t>
-            </a:r>
-            <a:r>
-              <a:rPr lang="it-IT" sz="3600" dirty="0" err="1"/>
-              <a:t>content</a:t>
-            </a:r>
-            <a:r>
-              <a:rPr lang="it-IT" sz="3600" dirty="0"/>
-              <a:t> </a:t>
-            </a:r>
-            <a:br>
-              <a:rPr lang="it-IT" dirty="0"/>
-            </a:br>
-            <a:r>
-              <a:rPr lang="en-GB" b="1" dirty="0"/>
-              <a:t>Exercises</a:t>
-            </a:r>
-            <a:r>
-              <a:rPr lang="en-GB" dirty="0"/>
-              <a:t> on </a:t>
-            </a:r>
-            <a:r>
-              <a:rPr lang="en-GB" b="1" dirty="0"/>
-              <a:t>code-snippets fill-in &amp; comment</a:t>
-            </a:r>
-            <a:endParaRPr lang="it-IT" b="1" dirty="0"/>
-          </a:p>
-        </p:txBody>
-      </p:sp>
-      <p:sp>
-        <p:nvSpPr>
-          <p:cNvPr id="10" name="Content Placeholder 9">
-            <a:extLst>
-              <a:ext uri="{FF2B5EF4-FFF2-40B4-BE49-F238E27FC236}">
-                <a16:creationId xmlns:a16="http://schemas.microsoft.com/office/drawing/2014/main" id="{74517F86-4B29-7742-9D41-82F9D9CAC7B3}"/>
-              </a:ext>
-            </a:extLst>
-          </p:cNvPr>
-          <p:cNvSpPr>
-            <a:spLocks noGrp="1"/>
-          </p:cNvSpPr>
-          <p:nvPr>
-            <p:ph idx="1"/>
           </p:nvPr>
         </p:nvSpPr>
         <p:spPr>
           <a:xfrm>
-            <a:off x="838200" y="1825625"/>
-            <a:ext cx="10791092" cy="4351339"/>
+            <a:off x="960228" y="2531006"/>
+            <a:ext cx="6777003" cy="1795989"/>
           </a:xfrm>
         </p:spPr>
         <p:txBody>
-          <a:bodyPr>
-            <a:normAutofit fontScale="77500" lnSpcReduction="20000"/>
+          <a:bodyPr/>
+          <a:lstStyle/>
+          <a:p>
+            <a:r>
+              <a:rPr lang="en" sz="2000" b="1">
+                <a:solidFill>
+                  <a:schemeClr val="tx1"/>
+                </a:solidFill>
+              </a:rPr>
+              <a:t>Streaming Data Analytics </a:t>
+            </a:r>
+            <a:br>
+              <a:rPr lang="en" sz="3200" b="1">
+                <a:solidFill>
+                  <a:schemeClr val="tx1"/>
+                </a:solidFill>
+              </a:rPr>
+            </a:br>
+            <a:r>
+              <a:rPr lang="en" sz="3200" b="1">
+                <a:solidFill>
+                  <a:schemeClr val="tx1"/>
+                </a:solidFill>
+              </a:rPr>
+              <a:t>Preview of the </a:t>
+            </a:r>
+            <a:br>
+              <a:rPr lang="en" sz="3200" b="1">
+                <a:solidFill>
+                  <a:schemeClr val="tx1"/>
+                </a:solidFill>
+              </a:rPr>
+            </a:br>
+            <a:r>
+              <a:rPr lang="en" sz="3200" b="1">
+                <a:solidFill>
+                  <a:schemeClr val="tx1"/>
+                </a:solidFill>
+              </a:rPr>
+              <a:t>part of the exam about </a:t>
+            </a:r>
+            <a:br>
+              <a:rPr lang="en" sz="3200" b="1">
+                <a:solidFill>
+                  <a:schemeClr val="tx1"/>
+                </a:solidFill>
+              </a:rPr>
+            </a:br>
+            <a:r>
+              <a:rPr lang="en" sz="3200" b="1">
+                <a:solidFill>
+                  <a:schemeClr val="tx1"/>
+                </a:solidFill>
+              </a:rPr>
+              <a:t>Streaming Data Engineering</a:t>
+            </a:r>
+            <a:endParaRPr lang="en-US" sz="4267" b="1" dirty="0">
+              <a:solidFill>
+                <a:schemeClr val="tx1"/>
+              </a:solidFill>
+            </a:endParaRPr>
+          </a:p>
+        </p:txBody>
+      </p:sp>
+      <p:sp>
+        <p:nvSpPr>
+          <p:cNvPr id="4" name="TextBox 3">
+            <a:extLst>
+              <a:ext uri="{FF2B5EF4-FFF2-40B4-BE49-F238E27FC236}">
+                <a16:creationId xmlns:a16="http://schemas.microsoft.com/office/drawing/2014/main" id="{8B388D4E-0571-CE4D-A7E6-D64A0DA6C4F5}"/>
+              </a:ext>
+            </a:extLst>
+          </p:cNvPr>
+          <p:cNvSpPr txBox="1"/>
+          <p:nvPr/>
+        </p:nvSpPr>
+        <p:spPr>
+          <a:xfrm>
+            <a:off x="3087445" y="4098664"/>
+            <a:ext cx="184731" cy="369332"/>
+          </a:xfrm>
+          <a:prstGeom prst="rect">
+            <a:avLst/>
+          </a:prstGeom>
+          <a:noFill/>
+        </p:spPr>
+        <p:txBody>
+          <a:bodyPr wrap="none" rtlCol="0">
+            <a:spAutoFit/>
           </a:bodyPr>
           <a:lstStyle/>
           <a:p>
-            <a:pPr marL="0" indent="0">
-              <a:buNone/>
-            </a:pPr>
-            <a:r>
-              <a:rPr lang="en-GB" dirty="0"/>
-              <a:t>model = ……………………………………………………………</a:t>
-            </a:r>
-          </a:p>
-          <a:p>
-            <a:pPr marL="0" indent="0">
-              <a:buNone/>
-            </a:pPr>
-            <a:endParaRPr lang="en-GB" dirty="0"/>
-          </a:p>
-          <a:p>
-            <a:pPr marL="0" indent="0">
-              <a:buNone/>
-            </a:pPr>
-            <a:r>
-              <a:rPr lang="en-GB" dirty="0"/>
-              <a:t>metric = ……………………………………………………………</a:t>
-            </a:r>
-          </a:p>
-          <a:p>
-            <a:pPr marL="0" indent="0">
-              <a:buNone/>
-            </a:pPr>
-            <a:r>
-              <a:rPr lang="en-GB" dirty="0"/>
-              <a:t>stream = </a:t>
-            </a:r>
-            <a:r>
-              <a:rPr lang="en-GB" dirty="0" err="1"/>
-              <a:t>iter_pandas</a:t>
-            </a:r>
-            <a:r>
-              <a:rPr lang="en-GB" dirty="0"/>
-              <a:t>(X=data[features], y=data['class'])</a:t>
-            </a:r>
-          </a:p>
-          <a:p>
-            <a:pPr marL="0" indent="0">
-              <a:buNone/>
-            </a:pPr>
-            <a:endParaRPr lang="en-GB" dirty="0"/>
-          </a:p>
-          <a:p>
-            <a:pPr marL="0" indent="0">
-              <a:buNone/>
-            </a:pPr>
-            <a:r>
-              <a:rPr lang="en-GB" dirty="0" err="1"/>
-              <a:t>progressive_val_score</a:t>
-            </a:r>
-            <a:r>
-              <a:rPr lang="en-GB" dirty="0"/>
-              <a:t>(	……………………………………………………………,</a:t>
-            </a:r>
-          </a:p>
-          <a:p>
-            <a:pPr marL="0" indent="0">
-              <a:buNone/>
-            </a:pPr>
-            <a:r>
-              <a:rPr lang="en-GB" dirty="0"/>
-              <a:t>			……………………………………………………………,</a:t>
-            </a:r>
-          </a:p>
-          <a:p>
-            <a:pPr marL="0" indent="0">
-              <a:buNone/>
-            </a:pPr>
-            <a:r>
-              <a:rPr lang="en-GB" dirty="0"/>
-              <a:t>			……………………………………………………………,</a:t>
-            </a:r>
-          </a:p>
-          <a:p>
-            <a:pPr marL="0" indent="0">
-              <a:buNone/>
-            </a:pPr>
-            <a:r>
-              <a:rPr lang="en-GB" dirty="0"/>
-              <a:t>                      		</a:t>
-            </a:r>
-            <a:r>
-              <a:rPr lang="en-GB" dirty="0" err="1"/>
-              <a:t>print_every</a:t>
-            </a:r>
-            <a:r>
-              <a:rPr lang="en-GB" dirty="0"/>
-              <a:t>=1000)</a:t>
-            </a:r>
-          </a:p>
-          <a:p>
-            <a:pPr marL="0" indent="0">
-              <a:buNone/>
-            </a:pPr>
-            <a:endParaRPr lang="en-GB" dirty="0"/>
-          </a:p>
-          <a:p>
-            <a:pPr marL="0" indent="0">
-              <a:buNone/>
-            </a:pPr>
-            <a:r>
-              <a:rPr lang="en-GB" dirty="0"/>
-              <a:t>For the solution see </a:t>
-            </a:r>
-            <a:r>
-              <a:rPr lang="en-GB" dirty="0">
-                <a:hlinkClick r:id="rId2"/>
-              </a:rPr>
-              <a:t>https://github.com/quantiaconsulting/streaming-machine-learning/blob/main/notebook/3.0_Stream_Classification.ipynb</a:t>
-            </a:r>
-            <a:r>
-              <a:rPr lang="en-GB" dirty="0"/>
-              <a:t> </a:t>
-            </a:r>
-          </a:p>
-        </p:txBody>
-      </p:sp>
-      <p:sp>
-        <p:nvSpPr>
-          <p:cNvPr id="7" name="Footer Placeholder 6">
-            <a:extLst>
-              <a:ext uri="{FF2B5EF4-FFF2-40B4-BE49-F238E27FC236}">
-                <a16:creationId xmlns:a16="http://schemas.microsoft.com/office/drawing/2014/main" id="{0C5A1F71-D77F-5049-B6DB-FD7CA69ED1CE}"/>
-              </a:ext>
-            </a:extLst>
-          </p:cNvPr>
-          <p:cNvSpPr>
-            <a:spLocks noGrp="1"/>
-          </p:cNvSpPr>
-          <p:nvPr>
-            <p:ph type="ftr" sz="quarter" idx="11"/>
-          </p:nvPr>
-        </p:nvSpPr>
-        <p:spPr/>
-        <p:txBody>
-          <a:bodyPr/>
-          <a:lstStyle/>
-          <a:p>
-            <a:r>
-              <a:rPr lang="en-US"/>
-              <a:t>Emanuele Della Valle - http://emanueledellavalle.org</a:t>
-            </a:r>
-          </a:p>
-        </p:txBody>
-      </p:sp>
-      <p:sp>
-        <p:nvSpPr>
-          <p:cNvPr id="8" name="Slide Number Placeholder 7">
-            <a:extLst>
-              <a:ext uri="{FF2B5EF4-FFF2-40B4-BE49-F238E27FC236}">
-                <a16:creationId xmlns:a16="http://schemas.microsoft.com/office/drawing/2014/main" id="{9316B443-3F82-BD42-92CF-B32FAD9B5193}"/>
-              </a:ext>
-            </a:extLst>
-          </p:cNvPr>
-          <p:cNvSpPr>
-            <a:spLocks noGrp="1"/>
-          </p:cNvSpPr>
-          <p:nvPr>
-            <p:ph type="sldNum" sz="quarter" idx="12"/>
-          </p:nvPr>
-        </p:nvSpPr>
-        <p:spPr/>
-        <p:txBody>
-          <a:bodyPr/>
-          <a:lstStyle/>
-          <a:p>
-            <a:fld id="{463394A2-5689-C845-95DB-27F089FB77B0}" type="slidenum">
-              <a:rPr lang="en-US" smtClean="0"/>
-              <a:t>9</a:t>
-            </a:fld>
-            <a:endParaRPr lang="en-US"/>
+            <a:endParaRPr lang="it-IT" dirty="0"/>
           </a:p>
         </p:txBody>
       </p:sp>
     </p:spTree>
     <p:extLst>
       <p:ext uri="{BB962C8B-B14F-4D97-AF65-F5344CB8AC3E}">
-        <p14:creationId xmlns:p14="http://schemas.microsoft.com/office/powerpoint/2010/main" val="267586542"/>
+        <p14:creationId xmlns:p14="http://schemas.microsoft.com/office/powerpoint/2010/main" val="1485291633"/>
       </p:ext>
     </p:extLst>
   </p:cSld>
   <p:clrMapOvr>
     <a:masterClrMapping/>
   </p:clrMapOvr>
+  <mc:AlternateContent xmlns:mc="http://schemas.openxmlformats.org/markup-compatibility/2006" xmlns:p14="http://schemas.microsoft.com/office/powerpoint/2010/main">
+    <mc:Choice Requires="p14">
+      <p:transition spd="med" p14:dur="700">
+        <p:fade/>
+      </p:transition>
+    </mc:Choice>
+    <mc:Fallback xmlns="">
+      <p:transition spd="med">
+        <p:fade/>
+      </p:transition>
+    </mc:Fallback>
+  </mc:AlternateContent>
 </p:sld>
 </file>
 

</xml_diff>